<commit_message>
Edited a shorter version
</commit_message>
<xml_diff>
--- a/Documentation/IPSO_Intro_IOTWEEK.pptx
+++ b/Documentation/IPSO_Intro_IOTWEEK.pptx
@@ -13,12 +13,12 @@
   <p:sldIdLst>
     <p:sldId id="259" r:id="rId2"/>
     <p:sldId id="315" r:id="rId3"/>
-    <p:sldId id="318" r:id="rId4"/>
+    <p:sldId id="325" r:id="rId4"/>
     <p:sldId id="320" r:id="rId5"/>
     <p:sldId id="321" r:id="rId6"/>
     <p:sldId id="322" r:id="rId7"/>
-    <p:sldId id="323" r:id="rId8"/>
-    <p:sldId id="324" r:id="rId9"/>
+    <p:sldId id="326" r:id="rId8"/>
+    <p:sldId id="327" r:id="rId9"/>
     <p:sldId id="314" r:id="rId10"/>
   </p:sldIdLst>
   <p:sldSz cx="12192000" cy="6858000"/>
@@ -1970,7 +1970,7 @@
             <a:fld id="{1D535339-8385-F148-A20E-9136B5CB9B04}" type="datetime1">
               <a:rPr lang="en-US" sz="1300"/>
               <a:pPr eaLnBrk="1" hangingPunct="1"/>
-              <a:t>15/06/2015</a:t>
+              <a:t>16/06/15</a:t>
             </a:fld>
             <a:r>
               <a:rPr lang="en-US" sz="1300"/>
@@ -2667,7 +2667,7 @@
             <a:fld id="{1D535339-8385-F148-A20E-9136B5CB9B04}" type="datetime1">
               <a:rPr lang="en-US" sz="1300"/>
               <a:pPr eaLnBrk="1" hangingPunct="1"/>
-              <a:t>15/06/2015</a:t>
+              <a:t>16/06/15</a:t>
             </a:fld>
             <a:r>
               <a:rPr lang="en-US" sz="1300"/>
@@ -3364,7 +3364,7 @@
             <a:fld id="{687D8F5A-1942-3B49-89A8-6C2610CB2196}" type="datetime1">
               <a:rPr lang="en-US" sz="1300"/>
               <a:pPr eaLnBrk="1" hangingPunct="1"/>
-              <a:t>15/06/2015</a:t>
+              <a:t>16/06/15</a:t>
             </a:fld>
             <a:r>
               <a:rPr lang="en-US" sz="1300"/>
@@ -4229,7 +4229,7 @@
             <a:fld id="{1D535339-8385-F148-A20E-9136B5CB9B04}" type="datetime1">
               <a:rPr lang="en-US" sz="1300"/>
               <a:pPr eaLnBrk="1" hangingPunct="1"/>
-              <a:t>15/06/2015</a:t>
+              <a:t>16/06/15</a:t>
             </a:fld>
             <a:r>
               <a:rPr lang="en-US" sz="1300"/>
@@ -4926,7 +4926,7 @@
             <a:fld id="{1D535339-8385-F148-A20E-9136B5CB9B04}" type="datetime1">
               <a:rPr lang="en-US" sz="1300"/>
               <a:pPr eaLnBrk="1" hangingPunct="1"/>
-              <a:t>15/06/2015</a:t>
+              <a:t>16/06/15</a:t>
             </a:fld>
             <a:r>
               <a:rPr lang="en-US" sz="1300"/>
@@ -10536,25 +10536,260 @@
           </a:p>
         </p:txBody>
       </p:sp>
+      <p:pic>
+        <p:nvPicPr>
+          <p:cNvPr id="4" name="Logo_ChapterSlide_Wide"/>
+          <p:cNvPicPr>
+            <a:picLocks/>
+          </p:cNvPicPr>
+          <p:nvPr/>
+        </p:nvPicPr>
+        <p:blipFill>
+          <a:blip r:embed="rId4">
+            <a:extLst>
+              <a:ext uri="{28A0092B-C50C-407E-A947-70E740481C1C}">
+                <a14:useLocalDpi xmlns:a14="http://schemas.microsoft.com/office/drawing/2010/main" val="0"/>
+              </a:ext>
+            </a:extLst>
+          </a:blip>
+          <a:stretch>
+            <a:fillRect/>
+          </a:stretch>
+        </p:blipFill>
+        <p:spPr>
+          <a:xfrm>
+            <a:off x="9605145" y="5061581"/>
+            <a:ext cx="3193633" cy="1796419"/>
+          </a:xfrm>
+          <a:prstGeom prst="rect">
+            <a:avLst/>
+          </a:prstGeom>
+        </p:spPr>
+      </p:pic>
       <p:sp>
         <p:nvSpPr>
-          <p:cNvPr id="3075" name="Subtitle 4"/>
-          <p:cNvSpPr>
-            <a:spLocks noGrp="1"/>
+          <p:cNvPr id="6" name="Subtitle 4"/>
+          <p:cNvSpPr txBox="1">
+            <a:spLocks/>
           </p:cNvSpPr>
-          <p:nvPr>
-            <p:ph type="subTitle" idx="1"/>
-          </p:nvPr>
+          <p:nvPr/>
         </p:nvSpPr>
-        <p:spPr>
+        <p:spPr bwMode="auto">
           <a:xfrm>
-            <a:off x="525463" y="4648200"/>
-            <a:ext cx="11139487" cy="1874838"/>
+            <a:off x="1052513" y="4648200"/>
+            <a:ext cx="9079265" cy="1874838"/>
           </a:xfrm>
+          <a:prstGeom prst="rect">
+            <a:avLst/>
+          </a:prstGeom>
+          <a:noFill/>
+          <a:ln>
+            <a:noFill/>
+          </a:ln>
+          <a:extLst>
+            <a:ext uri="{909E8E84-426E-40dd-AFC4-6F175D3DCCD1}">
+              <a14:hiddenFill xmlns:a14="http://schemas.microsoft.com/office/drawing/2010/main">
+                <a:solidFill>
+                  <a:srgbClr val="FFFFFF"/>
+                </a:solidFill>
+              </a14:hiddenFill>
+            </a:ext>
+            <a:ext uri="{91240B29-F687-4f45-9708-019B960494DF}">
+              <a14:hiddenLine xmlns:a14="http://schemas.microsoft.com/office/drawing/2010/main" w="9525">
+                <a:solidFill>
+                  <a:srgbClr val="000000"/>
+                </a:solidFill>
+                <a:miter lim="800000"/>
+                <a:headEnd/>
+                <a:tailEnd/>
+              </a14:hiddenLine>
+            </a:ext>
+          </a:extLst>
         </p:spPr>
         <p:txBody>
-          <a:bodyPr/>
-          <a:lstStyle/>
+          <a:bodyPr vert="horz" wrap="square" lIns="72000" tIns="0" rIns="72000" bIns="0" numCol="1" anchor="b" anchorCtr="0" compatLnSpc="1">
+            <a:prstTxWarp prst="textNoShape">
+              <a:avLst/>
+            </a:prstTxWarp>
+          </a:bodyPr>
+          <a:lstStyle>
+            <a:lvl1pPr marL="0" indent="0" algn="l" rtl="0" eaLnBrk="0" fontAlgn="base" hangingPunct="0">
+              <a:lnSpc>
+                <a:spcPct val="75000"/>
+              </a:lnSpc>
+              <a:spcBef>
+                <a:spcPts val="0"/>
+              </a:spcBef>
+              <a:spcAft>
+                <a:spcPct val="0"/>
+              </a:spcAft>
+              <a:buClr>
+                <a:srgbClr val="00A9D4"/>
+              </a:buClr>
+              <a:buFont typeface="Arial" charset="0"/>
+              <a:buNone/>
+              <a:defRPr sz="3000" baseline="0">
+                <a:solidFill>
+                  <a:schemeClr val="tx1"/>
+                </a:solidFill>
+                <a:latin typeface="+mn-lt"/>
+                <a:ea typeface="+mn-ea"/>
+                <a:cs typeface="+mn-cs"/>
+              </a:defRPr>
+            </a:lvl1pPr>
+            <a:lvl2pPr marL="533400" indent="-177800" algn="l" rtl="0" eaLnBrk="0" fontAlgn="base" hangingPunct="0">
+              <a:spcBef>
+                <a:spcPct val="20000"/>
+              </a:spcBef>
+              <a:spcAft>
+                <a:spcPct val="0"/>
+              </a:spcAft>
+              <a:buClr>
+                <a:schemeClr val="tx1"/>
+              </a:buClr>
+              <a:buFont typeface="Ericsson Capital TT" pitchFamily="2" charset="0"/>
+              <a:buChar char="–"/>
+              <a:defRPr sz="2000">
+                <a:solidFill>
+                  <a:schemeClr val="tx1"/>
+                </a:solidFill>
+                <a:latin typeface="+mn-lt"/>
+              </a:defRPr>
+            </a:lvl2pPr>
+            <a:lvl3pPr marL="892175" indent="-179388" algn="l" rtl="0" eaLnBrk="0" fontAlgn="base" hangingPunct="0">
+              <a:spcBef>
+                <a:spcPct val="20000"/>
+              </a:spcBef>
+              <a:spcAft>
+                <a:spcPct val="0"/>
+              </a:spcAft>
+              <a:buClr>
+                <a:srgbClr val="92CCE5"/>
+              </a:buClr>
+              <a:buFont typeface="Ericsson Capital TT" pitchFamily="2" charset="0"/>
+              <a:buChar char="›"/>
+              <a:defRPr sz="2000">
+                <a:solidFill>
+                  <a:schemeClr val="tx1"/>
+                </a:solidFill>
+                <a:latin typeface="+mn-lt"/>
+              </a:defRPr>
+            </a:lvl3pPr>
+            <a:lvl4pPr marL="1252538" indent="-180975" algn="l" rtl="0" eaLnBrk="0" fontAlgn="base" hangingPunct="0">
+              <a:spcBef>
+                <a:spcPct val="20000"/>
+              </a:spcBef>
+              <a:spcAft>
+                <a:spcPct val="0"/>
+              </a:spcAft>
+              <a:buClr>
+                <a:schemeClr val="tx1"/>
+              </a:buClr>
+              <a:buFont typeface="Ericsson Capital TT" pitchFamily="2" charset="0"/>
+              <a:buChar char="-"/>
+              <a:defRPr sz="2000">
+                <a:solidFill>
+                  <a:schemeClr val="tx1"/>
+                </a:solidFill>
+                <a:latin typeface="+mn-lt"/>
+              </a:defRPr>
+            </a:lvl4pPr>
+            <a:lvl5pPr marL="1614488" indent="-180975" algn="l" rtl="0" eaLnBrk="0" fontAlgn="base" hangingPunct="0">
+              <a:spcBef>
+                <a:spcPct val="20000"/>
+              </a:spcBef>
+              <a:spcAft>
+                <a:spcPct val="0"/>
+              </a:spcAft>
+              <a:buClr>
+                <a:schemeClr val="tx1"/>
+              </a:buClr>
+              <a:buFont typeface="Ericsson Capital TT" pitchFamily="2" charset="0"/>
+              <a:buChar char="›"/>
+              <a:defRPr sz="2000">
+                <a:solidFill>
+                  <a:schemeClr val="tx1"/>
+                </a:solidFill>
+                <a:latin typeface="+mn-lt"/>
+              </a:defRPr>
+            </a:lvl5pPr>
+            <a:lvl6pPr marL="2071688" indent="-180975" algn="l" rtl="0" eaLnBrk="1" fontAlgn="base" hangingPunct="1">
+              <a:spcBef>
+                <a:spcPct val="20000"/>
+              </a:spcBef>
+              <a:spcAft>
+                <a:spcPct val="0"/>
+              </a:spcAft>
+              <a:buClr>
+                <a:schemeClr val="tx1"/>
+              </a:buClr>
+              <a:buFont typeface="Ericsson Capital TT" pitchFamily="2" charset="0"/>
+              <a:buChar char="›"/>
+              <a:defRPr sz="2000">
+                <a:solidFill>
+                  <a:schemeClr val="tx1"/>
+                </a:solidFill>
+                <a:latin typeface="+mn-lt"/>
+              </a:defRPr>
+            </a:lvl6pPr>
+            <a:lvl7pPr marL="2528888" indent="-180975" algn="l" rtl="0" eaLnBrk="1" fontAlgn="base" hangingPunct="1">
+              <a:spcBef>
+                <a:spcPct val="20000"/>
+              </a:spcBef>
+              <a:spcAft>
+                <a:spcPct val="0"/>
+              </a:spcAft>
+              <a:buClr>
+                <a:schemeClr val="tx1"/>
+              </a:buClr>
+              <a:buFont typeface="Ericsson Capital TT" pitchFamily="2" charset="0"/>
+              <a:buChar char="›"/>
+              <a:defRPr sz="2000">
+                <a:solidFill>
+                  <a:schemeClr val="tx1"/>
+                </a:solidFill>
+                <a:latin typeface="+mn-lt"/>
+              </a:defRPr>
+            </a:lvl7pPr>
+            <a:lvl8pPr marL="2986088" indent="-180975" algn="l" rtl="0" eaLnBrk="1" fontAlgn="base" hangingPunct="1">
+              <a:spcBef>
+                <a:spcPct val="20000"/>
+              </a:spcBef>
+              <a:spcAft>
+                <a:spcPct val="0"/>
+              </a:spcAft>
+              <a:buClr>
+                <a:schemeClr val="tx1"/>
+              </a:buClr>
+              <a:buFont typeface="Ericsson Capital TT" pitchFamily="2" charset="0"/>
+              <a:buChar char="›"/>
+              <a:defRPr sz="2000">
+                <a:solidFill>
+                  <a:schemeClr val="tx1"/>
+                </a:solidFill>
+                <a:latin typeface="+mn-lt"/>
+              </a:defRPr>
+            </a:lvl8pPr>
+            <a:lvl9pPr marL="3443288" indent="-180975" algn="l" rtl="0" eaLnBrk="1" fontAlgn="base" hangingPunct="1">
+              <a:spcBef>
+                <a:spcPct val="20000"/>
+              </a:spcBef>
+              <a:spcAft>
+                <a:spcPct val="0"/>
+              </a:spcAft>
+              <a:buClr>
+                <a:schemeClr val="tx1"/>
+              </a:buClr>
+              <a:buFont typeface="Ericsson Capital TT" pitchFamily="2" charset="0"/>
+              <a:buChar char="›"/>
+              <a:defRPr sz="2000">
+                <a:solidFill>
+                  <a:schemeClr val="tx1"/>
+                </a:solidFill>
+                <a:latin typeface="+mn-lt"/>
+              </a:defRPr>
+            </a:lvl9pPr>
+          </a:lstStyle>
           <a:p>
             <a:pPr indent="-179388">
               <a:lnSpc>
@@ -10569,89 +10804,8 @@
                   </a:schemeClr>
                 </a:solidFill>
               </a:rPr>
-              <a:t>Jaime Jiménez, Ericsson Research, IPSO Smart Objects co-chair</a:t>
-            </a:r>
-            <a:r>
-              <a:rPr lang="en-US" sz="2400" dirty="0" smtClean="0">
-                <a:solidFill>
-                  <a:schemeClr val="tx1">
-                    <a:lumMod val="50000"/>
-                  </a:schemeClr>
-                </a:solidFill>
-              </a:rPr>
-              <a:t>.</a:t>
-            </a:r>
-          </a:p>
-          <a:p>
-            <a:pPr indent="-179388">
-              <a:lnSpc>
-                <a:spcPct val="120000"/>
-              </a:lnSpc>
-            </a:pPr>
-            <a:r>
-              <a:rPr lang="en-US" sz="2400" dirty="0" smtClean="0">
-                <a:solidFill>
-                  <a:schemeClr val="bg2">
-                    <a:lumMod val="50000"/>
-                  </a:schemeClr>
-                </a:solidFill>
-              </a:rPr>
-              <a:t>Michael </a:t>
-            </a:r>
-            <a:r>
-              <a:rPr lang="en-US" sz="2400" dirty="0" err="1" smtClean="0">
-                <a:solidFill>
-                  <a:schemeClr val="bg2">
-                    <a:lumMod val="50000"/>
-                  </a:schemeClr>
-                </a:solidFill>
-              </a:rPr>
-              <a:t>Koster</a:t>
-            </a:r>
-            <a:r>
-              <a:rPr lang="en-US" sz="2400" dirty="0" smtClean="0">
-                <a:solidFill>
-                  <a:schemeClr val="bg2">
-                    <a:lumMod val="50000"/>
-                  </a:schemeClr>
-                </a:solidFill>
-              </a:rPr>
-              <a:t>, ARM, IPSO Smart Objects Chair. </a:t>
-            </a:r>
-          </a:p>
-          <a:p>
-            <a:pPr indent="-179388">
-              <a:lnSpc>
-                <a:spcPct val="120000"/>
-              </a:lnSpc>
-            </a:pPr>
-            <a:r>
-              <a:rPr lang="en-US" sz="2400" i="1" dirty="0">
-                <a:solidFill>
-                  <a:schemeClr val="bg2">
-                    <a:lumMod val="50000"/>
-                  </a:schemeClr>
-                </a:solidFill>
-              </a:rPr>
-              <a:t>	</a:t>
-            </a:r>
-            <a:r>
-              <a:rPr lang="en-US" sz="2400" i="1" dirty="0" smtClean="0">
-                <a:solidFill>
-                  <a:schemeClr val="bg2">
-                    <a:lumMod val="50000"/>
-                  </a:schemeClr>
-                </a:solidFill>
-              </a:rPr>
-              <a:t>(credit to Michael’s slides, thanks!)</a:t>
-            </a:r>
-            <a:endParaRPr lang="en-US" sz="2400" i="1" dirty="0" smtClean="0">
-              <a:solidFill>
-                <a:schemeClr val="bg2">
-                  <a:lumMod val="50000"/>
-                </a:schemeClr>
-              </a:solidFill>
-            </a:endParaRPr>
+              <a:t>Jaime Jiménez, Ericsson Research, IPSO Smart Objects co-chair.</a:t>
+            </a:r>
           </a:p>
           <a:p>
             <a:pPr indent="-179388">
@@ -10986,7 +11140,7 @@
         </p:spPr>
         <p:txBody>
           <a:bodyPr>
-            <a:normAutofit/>
+            <a:normAutofit lnSpcReduction="10000"/>
           </a:bodyPr>
           <a:lstStyle/>
           <a:p>
@@ -10996,18 +11150,14 @@
             </a:r>
             <a:r>
               <a:rPr lang="en-US" sz="2400" dirty="0" smtClean="0"/>
-              <a:t>Alliance in </a:t>
-            </a:r>
+              <a:t>Alliance in the Smart Objects Working Group.</a:t>
+            </a:r>
+            <a:endParaRPr lang="en-US" sz="2400" dirty="0"/>
+          </a:p>
+          <a:p>
             <a:r>
               <a:rPr lang="en-US" sz="2400" dirty="0" smtClean="0"/>
-              <a:t>the Smart Objects Working Group.</a:t>
-            </a:r>
-            <a:endParaRPr lang="en-US" sz="2400" dirty="0"/>
-          </a:p>
-          <a:p>
-            <a:r>
-              <a:rPr lang="en-US" sz="2400" dirty="0" smtClean="0"/>
-              <a:t>Semantic </a:t>
+              <a:t>Work exclusively on semantic </a:t>
             </a:r>
             <a:r>
               <a:rPr lang="en-US" sz="2400" dirty="0"/>
@@ -11025,13 +11175,21 @@
           <a:p>
             <a:r>
               <a:rPr lang="en-US" sz="2400" dirty="0"/>
-              <a:t>Based on LWM2M Object Model.</a:t>
-            </a:r>
-          </a:p>
-          <a:p>
+              <a:t>Based on LWM2M Object </a:t>
+            </a:r>
+            <a:r>
+              <a:rPr lang="en-US" sz="2400" dirty="0" smtClean="0"/>
+              <a:t>Model.</a:t>
+            </a:r>
+          </a:p>
+          <a:p>
+            <a:r>
+              <a:rPr lang="en-US" sz="2400" dirty="0" smtClean="0"/>
+              <a:t>Reusable </a:t>
+            </a:r>
             <a:r>
               <a:rPr lang="en-US" sz="2400" dirty="0"/>
-              <a:t>Reusable Object IDs and Resource IDs.</a:t>
+              <a:t>Object IDs and Resource IDs.</a:t>
             </a:r>
           </a:p>
           <a:p>
@@ -11094,11 +11252,7 @@
           <a:p>
             <a:r>
               <a:rPr lang="en-US" sz="2400" dirty="0" smtClean="0"/>
-              <a:t>Tested </a:t>
-            </a:r>
-            <a:r>
-              <a:rPr lang="en-US" sz="2400" dirty="0" smtClean="0"/>
-              <a:t>over </a:t>
+              <a:t>Tested over </a:t>
             </a:r>
             <a:r>
               <a:rPr lang="en-US" sz="2400" dirty="0" err="1" smtClean="0"/>
@@ -11137,7 +11291,7 @@
     </p:spTree>
     <p:extLst>
       <p:ext uri="{BB962C8B-B14F-4D97-AF65-F5344CB8AC3E}">
-        <p14:creationId xmlns:p14="http://schemas.microsoft.com/office/powerpoint/2010/main" val="1086741277"/>
+        <p14:creationId xmlns:p14="http://schemas.microsoft.com/office/powerpoint/2010/main" val="267126367"/>
       </p:ext>
     </p:extLst>
   </p:cSld>
@@ -15802,80 +15956,55 @@
           </a:bodyPr>
           <a:lstStyle/>
           <a:p>
-            <a:r>
-              <a:rPr lang="en-US" sz="2000" dirty="0" smtClean="0"/>
-              <a:t>UPnP refactoring – from SOAP to REST.</a:t>
-            </a:r>
-          </a:p>
-          <a:p>
-            <a:r>
-              <a:rPr lang="en-US" sz="2000" dirty="0" smtClean="0"/>
-              <a:t>IETF 93 – Bits and Bites.</a:t>
-            </a:r>
-            <a:endParaRPr lang="en-US" sz="2000" dirty="0"/>
-          </a:p>
-          <a:p>
             <a:pPr marL="0" indent="0">
               <a:buNone/>
             </a:pPr>
             <a:r>
               <a:rPr lang="en-US" sz="2000" dirty="0"/>
-              <a:t>✔ </a:t>
+              <a:t>☐ UPnP harmonization – from SOAP to REST</a:t>
             </a:r>
             <a:r>
               <a:rPr lang="en-US" sz="2000" dirty="0" smtClean="0"/>
-              <a:t>Draft </a:t>
-            </a:r>
-            <a:r>
-              <a:rPr lang="en-US" sz="2000" dirty="0"/>
-              <a:t>Smart Object Data Model Design Guide @done (15-</a:t>
-            </a:r>
-            <a:r>
-              <a:rPr lang="en-US" sz="2000" dirty="0" smtClean="0"/>
-              <a:t>03-30)</a:t>
-            </a:r>
-            <a:endParaRPr lang="en-US" sz="2000" dirty="0"/>
+              <a:t>.</a:t>
+            </a:r>
           </a:p>
           <a:p>
             <a:pPr marL="0" indent="0">
               <a:buNone/>
             </a:pPr>
             <a:r>
-              <a:rPr lang="en-US" sz="2000" dirty="0"/>
-              <a:t>✔ </a:t>
-            </a:r>
-            <a:r>
               <a:rPr lang="en-US" sz="2000" dirty="0" smtClean="0"/>
-              <a:t>Draft </a:t>
-            </a:r>
-            <a:r>
-              <a:rPr lang="en-US" sz="2000" dirty="0"/>
-              <a:t>Smart Object Expansion Pack for Basic Objects @done (15-</a:t>
+              <a:t>☐ BLE/</a:t>
+            </a:r>
+            <a:r>
+              <a:rPr lang="en-US" sz="2000" dirty="0" err="1" smtClean="0"/>
+              <a:t>ZigBee</a:t>
             </a:r>
             <a:r>
               <a:rPr lang="en-US" sz="2000" dirty="0" smtClean="0"/>
-              <a:t>04-30)</a:t>
-            </a:r>
+              <a:t> harmonization.</a:t>
+            </a:r>
+            <a:endParaRPr lang="en-US" sz="2000" dirty="0"/>
           </a:p>
           <a:p>
             <a:pPr marL="0" indent="0">
               <a:buNone/>
             </a:pPr>
             <a:r>
+              <a:rPr lang="en-US" sz="2000" dirty="0" smtClean="0"/>
+              <a:t>✔ </a:t>
+            </a:r>
+            <a:r>
+              <a:rPr lang="en-US" sz="2000" dirty="0" smtClean="0"/>
+              <a:t>Draft </a:t>
+            </a:r>
+            <a:r>
               <a:rPr lang="en-US" sz="2000" dirty="0"/>
-              <a:t>✔ </a:t>
+              <a:t>Smart Object Data Model Design Guide @done (15-</a:t>
             </a:r>
             <a:r>
               <a:rPr lang="en-US" sz="2000" dirty="0" smtClean="0"/>
-              <a:t>Set up test servers for IPSO objects (LWM2M + TLV payload) </a:t>
-            </a:r>
-            <a:r>
-              <a:rPr lang="en-US" sz="2000" dirty="0"/>
-              <a:t>@done (15-</a:t>
-            </a:r>
-            <a:r>
-              <a:rPr lang="en-US" sz="2000" dirty="0" smtClean="0"/>
-              <a:t>06-15)</a:t>
+              <a:t>03-30)</a:t>
             </a:r>
             <a:endParaRPr lang="en-US" sz="2000" dirty="0"/>
           </a:p>
@@ -15884,34 +16013,41 @@
               <a:buNone/>
             </a:pPr>
             <a:r>
+              <a:rPr lang="en-US" sz="2000" dirty="0"/>
+              <a:t>✔ </a:t>
+            </a:r>
+            <a:r>
               <a:rPr lang="en-US" sz="2000" dirty="0" smtClean="0"/>
-              <a:t>☐ Draft </a:t>
+              <a:t>Draft </a:t>
             </a:r>
             <a:r>
               <a:rPr lang="en-US" sz="2000" dirty="0"/>
-              <a:t>Domain Specific Objects reference designs @due </a:t>
+              <a:t>Smart Object Expansion Pack for Basic Objects @done (15-</a:t>
             </a:r>
             <a:r>
               <a:rPr lang="en-US" sz="2000" dirty="0" smtClean="0"/>
-              <a:t>(mid 2015)</a:t>
-            </a:r>
-            <a:endParaRPr lang="en-US" sz="2000" dirty="0"/>
+              <a:t>04-30)</a:t>
+            </a:r>
           </a:p>
           <a:p>
             <a:pPr marL="0" indent="0">
               <a:buNone/>
             </a:pPr>
             <a:r>
+              <a:rPr lang="en-US" sz="2000" dirty="0"/>
+              <a:t>✔ </a:t>
+            </a:r>
+            <a:r>
               <a:rPr lang="en-US" sz="2000" dirty="0" smtClean="0"/>
-              <a:t>☐ Publish </a:t>
+              <a:t>Set up test servers for IPSO objects (LWM2M + TLV payload) </a:t>
             </a:r>
             <a:r>
               <a:rPr lang="en-US" sz="2000" dirty="0"/>
-              <a:t>Smart Object Data Model Design Guided @due(15-07</a:t>
+              <a:t>@done (15-</a:t>
             </a:r>
             <a:r>
               <a:rPr lang="en-US" sz="2000" dirty="0" smtClean="0"/>
-              <a:t>-31)</a:t>
+              <a:t>06-15)</a:t>
             </a:r>
             <a:endParaRPr lang="en-US" sz="2000" dirty="0"/>
           </a:p>
@@ -15921,15 +16057,15 @@
             </a:pPr>
             <a:r>
               <a:rPr lang="en-US" sz="2000" dirty="0" smtClean="0"/>
-              <a:t>☐ Publish </a:t>
+              <a:t>☐ Draft </a:t>
             </a:r>
             <a:r>
               <a:rPr lang="en-US" sz="2000" dirty="0"/>
-              <a:t>Smart Object Expansion Pack for Basic objects @due(15-07</a:t>
+              <a:t>Domain Specific Objects reference designs @due </a:t>
             </a:r>
             <a:r>
               <a:rPr lang="en-US" sz="2000" dirty="0" smtClean="0"/>
-              <a:t>-31)</a:t>
+              <a:t>(mid 2015)</a:t>
             </a:r>
             <a:endParaRPr lang="en-US" sz="2000" dirty="0"/>
           </a:p>
@@ -15943,7 +16079,7 @@
             </a:r>
             <a:r>
               <a:rPr lang="en-US" sz="2000" dirty="0"/>
-              <a:t>Smart Object Expansion Pack for Composite Objects @due(15-07</a:t>
+              <a:t>Smart Object Data Model Design Guided @due(15-07</a:t>
             </a:r>
             <a:r>
               <a:rPr lang="en-US" sz="2000" dirty="0" smtClean="0"/>
@@ -15961,12 +16097,79 @@
             </a:r>
             <a:r>
               <a:rPr lang="en-US" sz="2000" dirty="0"/>
+              <a:t>Smart Object Expansion Pack for Basic objects @due(15-07</a:t>
+            </a:r>
+            <a:r>
+              <a:rPr lang="en-US" sz="2000" dirty="0" smtClean="0"/>
+              <a:t>-31)</a:t>
+            </a:r>
+            <a:endParaRPr lang="en-US" sz="2000" dirty="0"/>
+          </a:p>
+          <a:p>
+            <a:pPr marL="0" indent="0">
+              <a:buNone/>
+            </a:pPr>
+            <a:r>
+              <a:rPr lang="en-US" sz="2000" dirty="0" smtClean="0"/>
+              <a:t>☐ Publish </a:t>
+            </a:r>
+            <a:r>
+              <a:rPr lang="en-US" sz="2000" dirty="0"/>
+              <a:t>Smart Object Expansion Pack for Composite Objects @due(15-07</a:t>
+            </a:r>
+            <a:r>
+              <a:rPr lang="en-US" sz="2000" dirty="0" smtClean="0"/>
+              <a:t>-31)</a:t>
+            </a:r>
+            <a:endParaRPr lang="en-US" sz="2000" dirty="0"/>
+          </a:p>
+          <a:p>
+            <a:pPr marL="0" indent="0">
+              <a:buNone/>
+            </a:pPr>
+            <a:r>
+              <a:rPr lang="en-US" sz="2000" dirty="0" smtClean="0"/>
+              <a:t>☐ Publish </a:t>
+            </a:r>
+            <a:r>
+              <a:rPr lang="en-US" sz="2000" dirty="0"/>
               <a:t>Smart Object Expansion Pack for Reference Devices @due(15-07-</a:t>
             </a:r>
             <a:r>
               <a:rPr lang="en-US" sz="2000" dirty="0" smtClean="0"/>
-              <a:t>31)</a:t>
-            </a:r>
+              <a:t>31</a:t>
+            </a:r>
+            <a:r>
+              <a:rPr lang="en-US" sz="2000" dirty="0" smtClean="0"/>
+              <a:t>)</a:t>
+            </a:r>
+          </a:p>
+          <a:p>
+            <a:pPr marL="0" indent="0">
+              <a:buNone/>
+            </a:pPr>
+            <a:r>
+              <a:rPr lang="en-US" sz="2000" dirty="0"/>
+              <a:t>☐ IETF 93 – Bits and </a:t>
+            </a:r>
+            <a:r>
+              <a:rPr lang="en-US" sz="2000" dirty="0" smtClean="0"/>
+              <a:t>Bites </a:t>
+            </a:r>
+            <a:r>
+              <a:rPr lang="en-US" sz="2000" dirty="0"/>
+              <a:t>@due(15-</a:t>
+            </a:r>
+            <a:r>
+              <a:rPr lang="en-US" sz="2000" dirty="0" smtClean="0"/>
+              <a:t>09-1)</a:t>
+            </a:r>
+            <a:endParaRPr lang="en-US" sz="2000" dirty="0"/>
+          </a:p>
+          <a:p>
+            <a:pPr marL="0" indent="0">
+              <a:buNone/>
+            </a:pPr>
             <a:endParaRPr lang="en-US" sz="2000" dirty="0"/>
           </a:p>
           <a:p>
@@ -15983,7 +16186,7 @@
     </p:spTree>
     <p:extLst>
       <p:ext uri="{BB962C8B-B14F-4D97-AF65-F5344CB8AC3E}">
-        <p14:creationId xmlns:p14="http://schemas.microsoft.com/office/powerpoint/2010/main" val="2751882334"/>
+        <p14:creationId xmlns:p14="http://schemas.microsoft.com/office/powerpoint/2010/main" val="1723045790"/>
       </p:ext>
     </p:extLst>
   </p:cSld>
@@ -16073,7 +16276,7 @@
         </p:spPr>
         <p:txBody>
           <a:bodyPr>
-            <a:normAutofit/>
+            <a:normAutofit fontScale="92500" lnSpcReduction="10000"/>
           </a:bodyPr>
           <a:lstStyle/>
           <a:p>
@@ -16085,7 +16288,7 @@
           <a:p>
             <a:pPr lvl="1"/>
             <a:r>
-              <a:rPr lang="en-US" smtClean="0"/>
+              <a:rPr lang="en-US" dirty="0" smtClean="0"/>
               <a:t>Working </a:t>
             </a:r>
             <a:r>
@@ -16184,7 +16387,68 @@
             </a:r>
             <a:r>
               <a:rPr lang="en-US" dirty="0" smtClean="0"/>
-              <a:t>very generic.</a:t>
+              <a:t>very generic</a:t>
+            </a:r>
+            <a:r>
+              <a:rPr lang="en-US" dirty="0" smtClean="0"/>
+              <a:t>.</a:t>
+            </a:r>
+          </a:p>
+          <a:p>
+            <a:pPr lvl="1"/>
+            <a:r>
+              <a:rPr lang="en-US" dirty="0" smtClean="0"/>
+              <a:t>Any vendor can use them for their specific area by creating their own Objects by reusing generic resources and add their own. </a:t>
+            </a:r>
+            <a:endParaRPr lang="en-US" dirty="0" smtClean="0"/>
+          </a:p>
+          <a:p>
+            <a:r>
+              <a:rPr lang="en-US" dirty="0" smtClean="0"/>
+              <a:t>Absolutely necessary for </a:t>
+            </a:r>
+            <a:r>
+              <a:rPr lang="en-US" dirty="0" err="1" smtClean="0"/>
+              <a:t>IoT</a:t>
+            </a:r>
+            <a:endParaRPr lang="en-US" dirty="0" smtClean="0"/>
+          </a:p>
+          <a:p>
+            <a:pPr lvl="1"/>
+            <a:r>
+              <a:rPr lang="en-US" dirty="0" smtClean="0"/>
+              <a:t>Harmonization </a:t>
+            </a:r>
+            <a:r>
+              <a:rPr lang="en-US" smtClean="0"/>
+              <a:t>and mapping between </a:t>
+            </a:r>
+            <a:r>
+              <a:rPr lang="en-US" dirty="0" smtClean="0"/>
+              <a:t>different data models &amp; standards.</a:t>
+            </a:r>
+          </a:p>
+          <a:p>
+            <a:pPr lvl="1"/>
+            <a:r>
+              <a:rPr lang="en-US" dirty="0" smtClean="0"/>
+              <a:t>Use of standards for Application Level interoperability btw devices and applications </a:t>
+            </a:r>
+            <a:r>
+              <a:rPr lang="en-US" dirty="0" err="1" smtClean="0"/>
+              <a:t>vs</a:t>
+            </a:r>
+            <a:r>
+              <a:rPr lang="en-US" dirty="0" smtClean="0"/>
+              <a:t> </a:t>
+            </a:r>
+            <a:r>
+              <a:rPr lang="en-US" dirty="0" err="1" smtClean="0"/>
+              <a:t>propietary</a:t>
+            </a:r>
+            <a:r>
+              <a:rPr lang="en-US" dirty="0" smtClean="0"/>
+              <a:t> solutions.</a:t>
             </a:r>
             <a:endParaRPr lang="en-US" dirty="0"/>
           </a:p>
@@ -16193,7 +16457,7 @@
     </p:spTree>
     <p:extLst>
       <p:ext uri="{BB962C8B-B14F-4D97-AF65-F5344CB8AC3E}">
-        <p14:creationId xmlns:p14="http://schemas.microsoft.com/office/powerpoint/2010/main" val="20723134"/>
+        <p14:creationId xmlns:p14="http://schemas.microsoft.com/office/powerpoint/2010/main" val="1987814611"/>
       </p:ext>
     </p:extLst>
   </p:cSld>

</xml_diff>